<commit_message>
code cleanup + bugfix
</commit_message>
<xml_diff>
--- a/PPT/Agora(2).pptx
+++ b/PPT/Agora(2).pptx
@@ -271,7 +271,7 @@
           <a:p>
             <a:fld id="{15C95964-8575-458D-9ABC-9F1C2CEECB29}" type="datetimeFigureOut">
               <a:rPr lang="en-US" smtClean="0"/>
-              <a:t>4/26/2022</a:t>
+              <a:t>4/27/2022</a:t>
             </a:fld>
             <a:endParaRPr lang="en-US"/>
           </a:p>
@@ -471,7 +471,7 @@
           <a:p>
             <a:fld id="{15C95964-8575-458D-9ABC-9F1C2CEECB29}" type="datetimeFigureOut">
               <a:rPr lang="en-US" smtClean="0"/>
-              <a:t>4/26/2022</a:t>
+              <a:t>4/27/2022</a:t>
             </a:fld>
             <a:endParaRPr lang="en-US"/>
           </a:p>
@@ -681,7 +681,7 @@
           <a:p>
             <a:fld id="{15C95964-8575-458D-9ABC-9F1C2CEECB29}" type="datetimeFigureOut">
               <a:rPr lang="en-US" smtClean="0"/>
-              <a:t>4/26/2022</a:t>
+              <a:t>4/27/2022</a:t>
             </a:fld>
             <a:endParaRPr lang="en-US"/>
           </a:p>
@@ -881,7 +881,7 @@
           <a:p>
             <a:fld id="{15C95964-8575-458D-9ABC-9F1C2CEECB29}" type="datetimeFigureOut">
               <a:rPr lang="en-US" smtClean="0"/>
-              <a:t>4/26/2022</a:t>
+              <a:t>4/27/2022</a:t>
             </a:fld>
             <a:endParaRPr lang="en-US"/>
           </a:p>
@@ -1157,7 +1157,7 @@
           <a:p>
             <a:fld id="{15C95964-8575-458D-9ABC-9F1C2CEECB29}" type="datetimeFigureOut">
               <a:rPr lang="en-US" smtClean="0"/>
-              <a:t>4/26/2022</a:t>
+              <a:t>4/27/2022</a:t>
             </a:fld>
             <a:endParaRPr lang="en-US"/>
           </a:p>
@@ -1425,7 +1425,7 @@
           <a:p>
             <a:fld id="{15C95964-8575-458D-9ABC-9F1C2CEECB29}" type="datetimeFigureOut">
               <a:rPr lang="en-US" smtClean="0"/>
-              <a:t>4/26/2022</a:t>
+              <a:t>4/27/2022</a:t>
             </a:fld>
             <a:endParaRPr lang="en-US"/>
           </a:p>
@@ -1840,7 +1840,7 @@
           <a:p>
             <a:fld id="{15C95964-8575-458D-9ABC-9F1C2CEECB29}" type="datetimeFigureOut">
               <a:rPr lang="en-US" smtClean="0"/>
-              <a:t>4/26/2022</a:t>
+              <a:t>4/27/2022</a:t>
             </a:fld>
             <a:endParaRPr lang="en-US"/>
           </a:p>
@@ -1982,7 +1982,7 @@
           <a:p>
             <a:fld id="{15C95964-8575-458D-9ABC-9F1C2CEECB29}" type="datetimeFigureOut">
               <a:rPr lang="en-US" smtClean="0"/>
-              <a:t>4/26/2022</a:t>
+              <a:t>4/27/2022</a:t>
             </a:fld>
             <a:endParaRPr lang="en-US"/>
           </a:p>
@@ -2095,7 +2095,7 @@
           <a:p>
             <a:fld id="{15C95964-8575-458D-9ABC-9F1C2CEECB29}" type="datetimeFigureOut">
               <a:rPr lang="en-US" smtClean="0"/>
-              <a:t>4/26/2022</a:t>
+              <a:t>4/27/2022</a:t>
             </a:fld>
             <a:endParaRPr lang="en-US"/>
           </a:p>
@@ -2408,7 +2408,7 @@
           <a:p>
             <a:fld id="{15C95964-8575-458D-9ABC-9F1C2CEECB29}" type="datetimeFigureOut">
               <a:rPr lang="en-US" smtClean="0"/>
-              <a:t>4/26/2022</a:t>
+              <a:t>4/27/2022</a:t>
             </a:fld>
             <a:endParaRPr lang="en-US"/>
           </a:p>
@@ -2697,7 +2697,7 @@
           <a:p>
             <a:fld id="{15C95964-8575-458D-9ABC-9F1C2CEECB29}" type="datetimeFigureOut">
               <a:rPr lang="en-US" smtClean="0"/>
-              <a:t>4/26/2022</a:t>
+              <a:t>4/27/2022</a:t>
             </a:fld>
             <a:endParaRPr lang="en-US"/>
           </a:p>
@@ -2875,37 +2875,82 @@
           <a:p>
             <a:pPr lvl="0"/>
             <a:r>
-              <a:rPr lang="en-GB" noProof="0"/>
-              <a:t>Mintaszöveg szerkesztése</a:t>
-            </a:r>
+              <a:rPr lang="en-GB" noProof="0" dirty="0" err="1"/>
+              <a:t>Mintaszöveg</a:t>
+            </a:r>
+            <a:r>
+              <a:rPr lang="en-GB" noProof="0" dirty="0"/>
+              <a:t> </a:t>
+            </a:r>
+            <a:r>
+              <a:rPr lang="en-GB" noProof="0" dirty="0" err="1"/>
+              <a:t>szerkesztése</a:t>
+            </a:r>
+            <a:endParaRPr lang="en-GB" noProof="0" dirty="0"/>
           </a:p>
           <a:p>
             <a:pPr lvl="1"/>
             <a:r>
-              <a:rPr lang="en-GB" noProof="0"/>
-              <a:t>Második szint</a:t>
-            </a:r>
+              <a:rPr lang="en-GB" noProof="0" dirty="0" err="1"/>
+              <a:t>Második</a:t>
+            </a:r>
+            <a:r>
+              <a:rPr lang="en-GB" noProof="0" dirty="0"/>
+              <a:t> </a:t>
+            </a:r>
+            <a:r>
+              <a:rPr lang="en-GB" noProof="0" dirty="0" err="1"/>
+              <a:t>szint</a:t>
+            </a:r>
+            <a:endParaRPr lang="en-GB" noProof="0" dirty="0"/>
           </a:p>
           <a:p>
             <a:pPr lvl="2"/>
             <a:r>
-              <a:rPr lang="en-GB" noProof="0"/>
-              <a:t>Harmadik szint</a:t>
-            </a:r>
+              <a:rPr lang="en-GB" noProof="0" dirty="0" err="1"/>
+              <a:t>Harmadik</a:t>
+            </a:r>
+            <a:r>
+              <a:rPr lang="en-GB" noProof="0" dirty="0"/>
+              <a:t> </a:t>
+            </a:r>
+            <a:r>
+              <a:rPr lang="en-GB" noProof="0" dirty="0" err="1"/>
+              <a:t>szint</a:t>
+            </a:r>
+            <a:endParaRPr lang="en-GB" noProof="0" dirty="0"/>
           </a:p>
           <a:p>
             <a:pPr lvl="3"/>
             <a:r>
-              <a:rPr lang="en-GB" noProof="0"/>
-              <a:t>Negyedik szint</a:t>
-            </a:r>
+              <a:rPr lang="en-GB" noProof="0" dirty="0" err="1"/>
+              <a:t>Negyedik</a:t>
+            </a:r>
+            <a:r>
+              <a:rPr lang="en-GB" noProof="0" dirty="0"/>
+              <a:t> </a:t>
+            </a:r>
+            <a:r>
+              <a:rPr lang="en-GB" noProof="0" dirty="0" err="1"/>
+              <a:t>szint</a:t>
+            </a:r>
+            <a:endParaRPr lang="en-GB" noProof="0" dirty="0"/>
           </a:p>
           <a:p>
             <a:pPr lvl="4"/>
             <a:r>
-              <a:rPr lang="en-GB" noProof="0"/>
-              <a:t>Ötödik szint</a:t>
-            </a:r>
+              <a:rPr lang="en-GB" noProof="0" dirty="0" err="1"/>
+              <a:t>Ötödik</a:t>
+            </a:r>
+            <a:r>
+              <a:rPr lang="en-GB" noProof="0" dirty="0"/>
+              <a:t> </a:t>
+            </a:r>
+            <a:r>
+              <a:rPr lang="en-GB" noProof="0" dirty="0" err="1"/>
+              <a:t>szint</a:t>
+            </a:r>
+            <a:endParaRPr lang="en-GB" noProof="0" dirty="0"/>
           </a:p>
         </p:txBody>
       </p:sp>
@@ -2950,7 +2995,7 @@
           <a:p>
             <a:fld id="{15C95964-8575-458D-9ABC-9F1C2CEECB29}" type="datetimeFigureOut">
               <a:rPr lang="en-US" smtClean="0"/>
-              <a:t>4/26/2022</a:t>
+              <a:t>4/27/2022</a:t>
             </a:fld>
             <a:endParaRPr lang="en-US"/>
           </a:p>
@@ -3462,19 +3507,19 @@
           <a:p>
             <a:r>
               <a:rPr lang="en-US" dirty="0"/>
-              <a:t>Made by:</a:t>
-            </a:r>
-          </a:p>
-          <a:p>
-            <a:r>
-              <a:rPr lang="hu-HU" b="1" dirty="0" err="1"/>
+              <a:t>Made by</a:t>
+            </a:r>
+          </a:p>
+          <a:p>
+            <a:r>
+              <a:rPr lang="hu-HU" sz="2800" b="1" dirty="0" err="1"/>
               <a:t>Bédi</a:t>
             </a:r>
             <a:r>
-              <a:rPr lang="hu-HU" b="1" dirty="0"/>
-              <a:t> Alexandra	Molnár Máté</a:t>
-            </a:r>
-            <a:endParaRPr lang="en-US" b="1" dirty="0"/>
+              <a:rPr lang="hu-HU" sz="2800" b="1" dirty="0"/>
+              <a:t> Alexandra		Molnár Máté</a:t>
+            </a:r>
+            <a:endParaRPr lang="en-US" sz="2800" b="1" dirty="0"/>
           </a:p>
         </p:txBody>
       </p:sp>
@@ -3509,8 +3554,8 @@
         </p:blipFill>
         <p:spPr>
           <a:xfrm>
-            <a:off x="3240210" y="2274620"/>
-            <a:ext cx="5439459" cy="1547115"/>
+            <a:off x="2725274" y="2004886"/>
+            <a:ext cx="6741453" cy="1917434"/>
           </a:xfrm>
           <a:prstGeom prst="rect">
             <a:avLst/>
@@ -3581,7 +3626,7 @@
         </p:blipFill>
         <p:spPr>
           <a:xfrm>
-            <a:off x="5375795" y="154909"/>
+            <a:off x="5663220" y="154909"/>
             <a:ext cx="865560" cy="1219099"/>
           </a:xfrm>
           <a:prstGeom prst="rect">
@@ -3751,13 +3796,13 @@
           </a:xfrm>
         </p:spPr>
         <p:txBody>
-          <a:bodyPr/>
-          <a:lstStyle/>
-          <a:p>
-            <a:r>
-              <a:rPr lang="en-US" b="1" dirty="0">
-                <a:latin typeface="IM FELL English" pitchFamily="2" charset="0"/>
-              </a:rPr>
+          <a:bodyPr>
+            <a:normAutofit/>
+          </a:bodyPr>
+          <a:lstStyle/>
+          <a:p>
+            <a:r>
+              <a:rPr lang="en-US" sz="6000" b="1" dirty="0"/>
               <a:t>Future</a:t>
             </a:r>
           </a:p>
@@ -3775,33 +3820,35 @@
         </p:nvSpPr>
         <p:spPr>
           <a:xfrm>
-            <a:off x="4430786" y="1690689"/>
-            <a:ext cx="3597478" cy="1738312"/>
-          </a:xfrm>
-        </p:spPr>
-        <p:txBody>
-          <a:bodyPr/>
-          <a:lstStyle/>
-          <a:p>
-            <a:r>
-              <a:rPr lang="en-US" dirty="0">
-                <a:latin typeface="IM FELL English" pitchFamily="2" charset="0"/>
+            <a:off x="4058480" y="1498241"/>
+            <a:ext cx="4075039" cy="1738312"/>
+          </a:xfrm>
+        </p:spPr>
+        <p:txBody>
+          <a:bodyPr>
+            <a:noAutofit/>
+          </a:bodyPr>
+          <a:lstStyle/>
+          <a:p>
+            <a:r>
+              <a:rPr lang="en-US" sz="3200" dirty="0">
+                <a:latin typeface="+mj-lt"/>
               </a:rPr>
               <a:t>Payment methods</a:t>
             </a:r>
           </a:p>
           <a:p>
             <a:r>
-              <a:rPr lang="en-US" dirty="0">
-                <a:latin typeface="IM FELL English" pitchFamily="2" charset="0"/>
+              <a:rPr lang="en-US" sz="3200" dirty="0">
+                <a:latin typeface="+mj-lt"/>
               </a:rPr>
               <a:t>Messages</a:t>
             </a:r>
           </a:p>
           <a:p>
             <a:r>
-              <a:rPr lang="en-US" dirty="0">
-                <a:latin typeface="IM FELL English" pitchFamily="2" charset="0"/>
+              <a:rPr lang="en-US" sz="3200" dirty="0">
+                <a:latin typeface="+mj-lt"/>
               </a:rPr>
               <a:t>Personalized orders</a:t>
             </a:r>
@@ -3810,10 +3857,10 @@
       </p:sp>
       <p:pic>
         <p:nvPicPr>
-          <p:cNvPr id="7" name="Kép 6">
-            <a:extLst>
-              <a:ext uri="{FF2B5EF4-FFF2-40B4-BE49-F238E27FC236}">
-                <a16:creationId xmlns:a16="http://schemas.microsoft.com/office/drawing/2014/main" id="{80D76DBA-E9DF-4930-AC23-0E0BF22D9D91}"/>
+          <p:cNvPr id="9" name="Kép 8">
+            <a:extLst>
+              <a:ext uri="{FF2B5EF4-FFF2-40B4-BE49-F238E27FC236}">
+                <a16:creationId xmlns:a16="http://schemas.microsoft.com/office/drawing/2014/main" id="{193AEA91-6664-4EC3-B7B3-405EFA0A6ECD}"/>
               </a:ext>
             </a:extLst>
           </p:cNvPr>
@@ -3822,15 +3869,22 @@
           </p:cNvPicPr>
           <p:nvPr/>
         </p:nvPicPr>
-        <p:blipFill rotWithShape="1">
-          <a:blip r:embed="rId2"/>
-          <a:srcRect l="16743" t="37639" r="53750" b="24653"/>
-          <a:stretch/>
+        <p:blipFill>
+          <a:blip r:embed="rId2">
+            <a:extLst>
+              <a:ext uri="{28A0092B-C50C-407E-A947-70E740481C1C}">
+                <a14:useLocalDpi xmlns:a14="http://schemas.microsoft.com/office/drawing/2010/main" val="0"/>
+              </a:ext>
+            </a:extLst>
+          </a:blip>
+          <a:stretch>
+            <a:fillRect/>
+          </a:stretch>
         </p:blipFill>
         <p:spPr>
           <a:xfrm>
-            <a:off x="6910795" y="3842963"/>
-            <a:ext cx="3742571" cy="2690336"/>
+            <a:off x="1868561" y="3857249"/>
+            <a:ext cx="5124450" cy="2690336"/>
           </a:xfrm>
           <a:prstGeom prst="rect">
             <a:avLst/>
@@ -3839,10 +3893,10 @@
       </p:pic>
       <p:pic>
         <p:nvPicPr>
-          <p:cNvPr id="9" name="Kép 8">
-            <a:extLst>
-              <a:ext uri="{FF2B5EF4-FFF2-40B4-BE49-F238E27FC236}">
-                <a16:creationId xmlns:a16="http://schemas.microsoft.com/office/drawing/2014/main" id="{193AEA91-6664-4EC3-B7B3-405EFA0A6ECD}"/>
+          <p:cNvPr id="10" name="Kép 9">
+            <a:extLst>
+              <a:ext uri="{FF2B5EF4-FFF2-40B4-BE49-F238E27FC236}">
+                <a16:creationId xmlns:a16="http://schemas.microsoft.com/office/drawing/2014/main" id="{77D37303-39D1-4EE8-92FC-57890481303C}"/>
               </a:ext>
             </a:extLst>
           </p:cNvPr>
@@ -3865,8 +3919,8 @@
         </p:blipFill>
         <p:spPr>
           <a:xfrm>
-            <a:off x="971550" y="3842963"/>
-            <a:ext cx="5124450" cy="2690336"/>
+            <a:off x="7303851" y="3852616"/>
+            <a:ext cx="2690336" cy="2690336"/>
           </a:xfrm>
           <a:prstGeom prst="rect">
             <a:avLst/>
@@ -3984,15 +4038,11 @@
           <a:lstStyle/>
           <a:p>
             <a:r>
-              <a:rPr lang="en-US" dirty="0">
-                <a:latin typeface="IM FELL English" pitchFamily="2" charset="0"/>
-              </a:rPr>
+              <a:rPr lang="en-US" dirty="0"/>
               <a:t>Thank you for your attention</a:t>
             </a:r>
             <a:r>
-              <a:rPr lang="hu-HU" dirty="0">
-                <a:latin typeface="IM FELL English" pitchFamily="2" charset="0"/>
-              </a:rPr>
+              <a:rPr lang="hu-HU" dirty="0"/>
               <a:t>!</a:t>
             </a:r>
           </a:p>
@@ -4111,16 +4161,16 @@
         </p:nvSpPr>
         <p:spPr/>
         <p:txBody>
-          <a:bodyPr/>
-          <a:lstStyle/>
-          <a:p>
-            <a:r>
-              <a:rPr lang="en-GB" b="1" dirty="0">
-                <a:latin typeface="IM FELL English" pitchFamily="2" charset="0"/>
-              </a:rPr>
+          <a:bodyPr>
+            <a:normAutofit/>
+          </a:bodyPr>
+          <a:lstStyle/>
+          <a:p>
+            <a:r>
+              <a:rPr lang="en-GB" sz="6000" b="1" dirty="0"/>
               <a:t>Purpose of Software</a:t>
             </a:r>
-            <a:endParaRPr lang="en-GB" dirty="0"/>
+            <a:endParaRPr lang="en-GB" sz="6000" dirty="0"/>
           </a:p>
         </p:txBody>
       </p:sp>
@@ -4142,8 +4192,8 @@
         </p:nvSpPr>
         <p:spPr>
           <a:xfrm>
-            <a:off x="1656007" y="2832523"/>
-            <a:ext cx="8879986" cy="3073036"/>
+            <a:off x="1656007" y="3061123"/>
+            <a:ext cx="8879986" cy="2617301"/>
           </a:xfrm>
         </p:spPr>
         <p:txBody>
@@ -4316,11 +4366,13 @@
           </a:xfrm>
         </p:spPr>
         <p:txBody>
-          <a:bodyPr/>
-          <a:lstStyle/>
-          <a:p>
-            <a:r>
-              <a:rPr lang="en-GB" dirty="0"/>
+          <a:bodyPr>
+            <a:normAutofit/>
+          </a:bodyPr>
+          <a:lstStyle/>
+          <a:p>
+            <a:r>
+              <a:rPr lang="en-GB" sz="5400" dirty="0"/>
               <a:t>Features</a:t>
             </a:r>
           </a:p>
@@ -4463,100 +4515,10 @@
       </p:grpSpPr>
       <p:sp>
         <p:nvSpPr>
-          <p:cNvPr id="2" name="Cím 1">
-            <a:extLst>
-              <a:ext uri="{FF2B5EF4-FFF2-40B4-BE49-F238E27FC236}">
-                <a16:creationId xmlns:a16="http://schemas.microsoft.com/office/drawing/2014/main" id="{73730639-81BF-4977-AED7-A6C96E0F1329}"/>
-              </a:ext>
-            </a:extLst>
-          </p:cNvPr>
-          <p:cNvSpPr>
-            <a:spLocks noGrp="1"/>
-          </p:cNvSpPr>
-          <p:nvPr>
-            <p:ph type="title"/>
-          </p:nvPr>
-        </p:nvSpPr>
-        <p:spPr>
-          <a:xfrm>
-            <a:off x="2696546" y="748302"/>
-            <a:ext cx="6798907" cy="1325563"/>
-          </a:xfrm>
-        </p:spPr>
-        <p:txBody>
-          <a:bodyPr/>
-          <a:lstStyle/>
-          <a:p>
-            <a:r>
-              <a:rPr lang="en-US" b="1" dirty="0">
-                <a:latin typeface="IM FELL English" pitchFamily="2" charset="0"/>
-              </a:rPr>
-              <a:t>Components</a:t>
-            </a:r>
-            <a:endParaRPr lang="en-US" dirty="0"/>
-          </a:p>
-        </p:txBody>
-      </p:sp>
-      <p:sp>
-        <p:nvSpPr>
-          <p:cNvPr id="3" name="Tartalom helye 2">
-            <a:extLst>
-              <a:ext uri="{FF2B5EF4-FFF2-40B4-BE49-F238E27FC236}">
-                <a16:creationId xmlns:a16="http://schemas.microsoft.com/office/drawing/2014/main" id="{96F2F461-EF4F-47F5-B1E9-4CB62D2DDD29}"/>
-              </a:ext>
-            </a:extLst>
-          </p:cNvPr>
-          <p:cNvSpPr>
-            <a:spLocks noGrp="1"/>
-          </p:cNvSpPr>
-          <p:nvPr>
-            <p:ph idx="1"/>
-          </p:nvPr>
-        </p:nvSpPr>
-        <p:spPr>
-          <a:xfrm>
-            <a:off x="3894871" y="2351313"/>
-            <a:ext cx="4402258" cy="3340439"/>
-          </a:xfrm>
-        </p:spPr>
-        <p:txBody>
-          <a:bodyPr/>
-          <a:lstStyle/>
-          <a:p>
-            <a:r>
-              <a:rPr lang="en-US" sz="4000" dirty="0">
-                <a:latin typeface="IM FELL English" pitchFamily="2" charset="0"/>
-              </a:rPr>
-              <a:t>Backend Node.js</a:t>
-            </a:r>
-          </a:p>
-          <a:p>
-            <a:r>
-              <a:rPr lang="en-US" sz="4000" dirty="0">
-                <a:latin typeface="IM FELL English" pitchFamily="2" charset="0"/>
-              </a:rPr>
-              <a:t>Frontend Angular</a:t>
-            </a:r>
-          </a:p>
-          <a:p>
-            <a:r>
-              <a:rPr lang="en-US" sz="4000" dirty="0">
-                <a:latin typeface="IM FELL English" pitchFamily="2" charset="0"/>
-              </a:rPr>
-              <a:t>Database MySQL</a:t>
-            </a:r>
-          </a:p>
-          <a:p>
-            <a:endParaRPr lang="en-US" dirty="0"/>
-          </a:p>
-        </p:txBody>
-      </p:sp>
-      <p:sp>
-        <p:nvSpPr>
-          <p:cNvPr id="4" name="Téglalap 3">
-            <a:extLst>
-              <a:ext uri="{FF2B5EF4-FFF2-40B4-BE49-F238E27FC236}">
-                <a16:creationId xmlns:a16="http://schemas.microsoft.com/office/drawing/2014/main" id="{935D8F91-E96C-42F5-8662-52827F919FBB}"/>
+          <p:cNvPr id="19" name="Téglalap 18">
+            <a:extLst>
+              <a:ext uri="{FF2B5EF4-FFF2-40B4-BE49-F238E27FC236}">
+                <a16:creationId xmlns:a16="http://schemas.microsoft.com/office/drawing/2014/main" id="{5BE740C4-E43B-40BC-BB17-F6D4E359C65D}"/>
               </a:ext>
             </a:extLst>
           </p:cNvPr>
@@ -4612,10 +4574,422 @@
       </p:sp>
       <p:sp>
         <p:nvSpPr>
-          <p:cNvPr id="5" name="Téglalap 4">
-            <a:extLst>
-              <a:ext uri="{FF2B5EF4-FFF2-40B4-BE49-F238E27FC236}">
-                <a16:creationId xmlns:a16="http://schemas.microsoft.com/office/drawing/2014/main" id="{D8891E4E-9C57-44EE-92D7-6E473CFB086F}"/>
+          <p:cNvPr id="2" name="Cím 1">
+            <a:extLst>
+              <a:ext uri="{FF2B5EF4-FFF2-40B4-BE49-F238E27FC236}">
+                <a16:creationId xmlns:a16="http://schemas.microsoft.com/office/drawing/2014/main" id="{73730639-81BF-4977-AED7-A6C96E0F1329}"/>
+              </a:ext>
+            </a:extLst>
+          </p:cNvPr>
+          <p:cNvSpPr>
+            <a:spLocks noGrp="1"/>
+          </p:cNvSpPr>
+          <p:nvPr>
+            <p:ph type="title"/>
+          </p:nvPr>
+        </p:nvSpPr>
+        <p:spPr>
+          <a:xfrm>
+            <a:off x="2483506" y="293389"/>
+            <a:ext cx="6798907" cy="1325563"/>
+          </a:xfrm>
+        </p:spPr>
+        <p:txBody>
+          <a:bodyPr/>
+          <a:lstStyle/>
+          <a:p>
+            <a:r>
+              <a:rPr lang="en-US" b="1" dirty="0"/>
+              <a:t>Components</a:t>
+            </a:r>
+            <a:endParaRPr lang="en-US" dirty="0"/>
+          </a:p>
+        </p:txBody>
+      </p:sp>
+      <p:sp>
+        <p:nvSpPr>
+          <p:cNvPr id="3" name="Tartalom helye 2">
+            <a:extLst>
+              <a:ext uri="{FF2B5EF4-FFF2-40B4-BE49-F238E27FC236}">
+                <a16:creationId xmlns:a16="http://schemas.microsoft.com/office/drawing/2014/main" id="{96F2F461-EF4F-47F5-B1E9-4CB62D2DDD29}"/>
+              </a:ext>
+            </a:extLst>
+          </p:cNvPr>
+          <p:cNvSpPr>
+            <a:spLocks noGrp="1"/>
+          </p:cNvSpPr>
+          <p:nvPr>
+            <p:ph idx="1"/>
+          </p:nvPr>
+        </p:nvSpPr>
+        <p:spPr>
+          <a:xfrm>
+            <a:off x="5608938" y="2160150"/>
+            <a:ext cx="3006387" cy="3073996"/>
+          </a:xfrm>
+        </p:spPr>
+        <p:txBody>
+          <a:bodyPr>
+            <a:normAutofit fontScale="92500" lnSpcReduction="10000"/>
+          </a:bodyPr>
+          <a:lstStyle/>
+          <a:p>
+            <a:pPr>
+              <a:lnSpc>
+                <a:spcPct val="150000"/>
+              </a:lnSpc>
+            </a:pPr>
+            <a:r>
+              <a:rPr lang="en-US" sz="4800" b="1" dirty="0">
+                <a:solidFill>
+                  <a:srgbClr val="DD0031"/>
+                </a:solidFill>
+                <a:latin typeface="+mj-lt"/>
+              </a:rPr>
+              <a:t>Frontend</a:t>
+            </a:r>
+          </a:p>
+          <a:p>
+            <a:pPr>
+              <a:lnSpc>
+                <a:spcPct val="150000"/>
+              </a:lnSpc>
+            </a:pPr>
+            <a:r>
+              <a:rPr lang="en-US" sz="4800" b="1" dirty="0">
+                <a:solidFill>
+                  <a:srgbClr val="3E863D"/>
+                </a:solidFill>
+                <a:latin typeface="+mj-lt"/>
+              </a:rPr>
+              <a:t>Backend</a:t>
+            </a:r>
+          </a:p>
+          <a:p>
+            <a:pPr>
+              <a:lnSpc>
+                <a:spcPct val="150000"/>
+              </a:lnSpc>
+            </a:pPr>
+            <a:r>
+              <a:rPr lang="en-US" sz="4800" b="1" dirty="0">
+                <a:solidFill>
+                  <a:srgbClr val="00628B"/>
+                </a:solidFill>
+                <a:latin typeface="+mj-lt"/>
+              </a:rPr>
+              <a:t>Database</a:t>
+            </a:r>
+          </a:p>
+        </p:txBody>
+      </p:sp>
+      <p:sp>
+        <p:nvSpPr>
+          <p:cNvPr id="7" name="Rombusz 6">
+            <a:extLst>
+              <a:ext uri="{FF2B5EF4-FFF2-40B4-BE49-F238E27FC236}">
+                <a16:creationId xmlns:a16="http://schemas.microsoft.com/office/drawing/2014/main" id="{AB0AD49A-8983-4A9D-93D5-EB9373D874E9}"/>
+              </a:ext>
+            </a:extLst>
+          </p:cNvPr>
+          <p:cNvSpPr/>
+          <p:nvPr/>
+        </p:nvSpPr>
+        <p:spPr>
+          <a:xfrm>
+            <a:off x="1334471" y="3957668"/>
+            <a:ext cx="3842077" cy="1397409"/>
+          </a:xfrm>
+          <a:prstGeom prst="diamond">
+            <a:avLst/>
+          </a:prstGeom>
+          <a:solidFill>
+            <a:srgbClr val="00628B"/>
+          </a:solidFill>
+          <a:ln>
+            <a:noFill/>
+          </a:ln>
+          <a:effectLst>
+            <a:outerShdw blurRad="50800" dist="38100" dir="5400000" algn="t" rotWithShape="0">
+              <a:prstClr val="black">
+                <a:alpha val="40000"/>
+              </a:prstClr>
+            </a:outerShdw>
+          </a:effectLst>
+        </p:spPr>
+        <p:style>
+          <a:lnRef idx="2">
+            <a:schemeClr val="accent1">
+              <a:shade val="50000"/>
+            </a:schemeClr>
+          </a:lnRef>
+          <a:fillRef idx="1">
+            <a:schemeClr val="accent1"/>
+          </a:fillRef>
+          <a:effectRef idx="0">
+            <a:schemeClr val="accent1"/>
+          </a:effectRef>
+          <a:fontRef idx="minor">
+            <a:schemeClr val="lt1"/>
+          </a:fontRef>
+        </p:style>
+        <p:txBody>
+          <a:bodyPr rtlCol="0" anchor="ctr"/>
+          <a:lstStyle/>
+          <a:p>
+            <a:pPr algn="ctr"/>
+            <a:endParaRPr lang="en-US" dirty="0"/>
+          </a:p>
+        </p:txBody>
+      </p:sp>
+      <p:pic>
+        <p:nvPicPr>
+          <p:cNvPr id="11" name="Kép 10">
+            <a:extLst>
+              <a:ext uri="{FF2B5EF4-FFF2-40B4-BE49-F238E27FC236}">
+                <a16:creationId xmlns:a16="http://schemas.microsoft.com/office/drawing/2014/main" id="{E26E9327-662D-4362-8378-BFF56875FEA0}"/>
+              </a:ext>
+            </a:extLst>
+          </p:cNvPr>
+          <p:cNvPicPr>
+            <a:picLocks noChangeAspect="1"/>
+          </p:cNvPicPr>
+          <p:nvPr/>
+        </p:nvPicPr>
+        <p:blipFill>
+          <a:blip r:embed="rId2" cstate="hqprint">
+            <a:extLst>
+              <a:ext uri="{28A0092B-C50C-407E-A947-70E740481C1C}">
+                <a14:useLocalDpi xmlns:a14="http://schemas.microsoft.com/office/drawing/2010/main" val="0"/>
+              </a:ext>
+            </a:extLst>
+          </a:blip>
+          <a:stretch>
+            <a:fillRect/>
+          </a:stretch>
+        </p:blipFill>
+        <p:spPr>
+          <a:xfrm>
+            <a:off x="1779829" y="3502877"/>
+            <a:ext cx="3117496" cy="2078330"/>
+          </a:xfrm>
+          <a:prstGeom prst="rect">
+            <a:avLst/>
+          </a:prstGeom>
+          <a:scene3d>
+            <a:camera prst="isometricOffAxis2Top"/>
+            <a:lightRig rig="threePt" dir="t"/>
+          </a:scene3d>
+        </p:spPr>
+      </p:pic>
+      <p:sp>
+        <p:nvSpPr>
+          <p:cNvPr id="8" name="Rombusz 7">
+            <a:extLst>
+              <a:ext uri="{FF2B5EF4-FFF2-40B4-BE49-F238E27FC236}">
+                <a16:creationId xmlns:a16="http://schemas.microsoft.com/office/drawing/2014/main" id="{494DBC05-1FB6-45E3-9370-182AD8E4CA78}"/>
+              </a:ext>
+            </a:extLst>
+          </p:cNvPr>
+          <p:cNvSpPr/>
+          <p:nvPr/>
+        </p:nvSpPr>
+        <p:spPr>
+          <a:xfrm>
+            <a:off x="1302522" y="3024771"/>
+            <a:ext cx="3842077" cy="1397409"/>
+          </a:xfrm>
+          <a:prstGeom prst="diamond">
+            <a:avLst/>
+          </a:prstGeom>
+          <a:solidFill>
+            <a:srgbClr val="3E863D"/>
+          </a:solidFill>
+          <a:ln>
+            <a:noFill/>
+          </a:ln>
+          <a:effectLst>
+            <a:outerShdw blurRad="50800" dist="38100" dir="5400000" algn="t" rotWithShape="0">
+              <a:prstClr val="black">
+                <a:alpha val="40000"/>
+              </a:prstClr>
+            </a:outerShdw>
+          </a:effectLst>
+        </p:spPr>
+        <p:style>
+          <a:lnRef idx="2">
+            <a:schemeClr val="accent1">
+              <a:shade val="50000"/>
+            </a:schemeClr>
+          </a:lnRef>
+          <a:fillRef idx="1">
+            <a:schemeClr val="accent1"/>
+          </a:fillRef>
+          <a:effectRef idx="0">
+            <a:schemeClr val="accent1"/>
+          </a:effectRef>
+          <a:fontRef idx="minor">
+            <a:schemeClr val="lt1"/>
+          </a:fontRef>
+        </p:style>
+        <p:txBody>
+          <a:bodyPr rtlCol="0" anchor="ctr"/>
+          <a:lstStyle/>
+          <a:p>
+            <a:pPr algn="ctr"/>
+            <a:endParaRPr lang="en-US" dirty="0"/>
+          </a:p>
+        </p:txBody>
+      </p:sp>
+      <p:pic>
+        <p:nvPicPr>
+          <p:cNvPr id="10" name="Kép 9">
+            <a:extLst>
+              <a:ext uri="{FF2B5EF4-FFF2-40B4-BE49-F238E27FC236}">
+                <a16:creationId xmlns:a16="http://schemas.microsoft.com/office/drawing/2014/main" id="{C193578A-18A8-4C70-A581-54903DEDAAD5}"/>
+              </a:ext>
+            </a:extLst>
+          </p:cNvPr>
+          <p:cNvPicPr>
+            <a:picLocks noChangeAspect="1"/>
+          </p:cNvPicPr>
+          <p:nvPr/>
+        </p:nvPicPr>
+        <p:blipFill>
+          <a:blip r:embed="rId3" cstate="hqprint">
+            <a:extLst>
+              <a:ext uri="{28A0092B-C50C-407E-A947-70E740481C1C}">
+                <a14:useLocalDpi xmlns:a14="http://schemas.microsoft.com/office/drawing/2010/main" val="0"/>
+              </a:ext>
+            </a:extLst>
+          </a:blip>
+          <a:stretch>
+            <a:fillRect/>
+          </a:stretch>
+        </p:blipFill>
+        <p:spPr>
+          <a:xfrm>
+            <a:off x="1901945" y="2952987"/>
+            <a:ext cx="2433224" cy="1488322"/>
+          </a:xfrm>
+          <a:prstGeom prst="rect">
+            <a:avLst/>
+          </a:prstGeom>
+          <a:scene3d>
+            <a:camera prst="isometricOffAxis2Top"/>
+            <a:lightRig rig="threePt" dir="t"/>
+          </a:scene3d>
+        </p:spPr>
+      </p:pic>
+      <p:sp>
+        <p:nvSpPr>
+          <p:cNvPr id="9" name="Rombusz 8">
+            <a:extLst>
+              <a:ext uri="{FF2B5EF4-FFF2-40B4-BE49-F238E27FC236}">
+                <a16:creationId xmlns:a16="http://schemas.microsoft.com/office/drawing/2014/main" id="{1C382A99-9420-4389-9909-2EC6540F02D6}"/>
+              </a:ext>
+            </a:extLst>
+          </p:cNvPr>
+          <p:cNvSpPr/>
+          <p:nvPr/>
+        </p:nvSpPr>
+        <p:spPr>
+          <a:xfrm>
+            <a:off x="1237791" y="2105468"/>
+            <a:ext cx="3842077" cy="1397409"/>
+          </a:xfrm>
+          <a:prstGeom prst="diamond">
+            <a:avLst/>
+          </a:prstGeom>
+          <a:solidFill>
+            <a:srgbClr val="DD0031"/>
+          </a:solidFill>
+          <a:ln>
+            <a:noFill/>
+          </a:ln>
+          <a:effectLst>
+            <a:outerShdw blurRad="50800" dist="38100" dir="5400000" algn="t" rotWithShape="0">
+              <a:prstClr val="black">
+                <a:alpha val="40000"/>
+              </a:prstClr>
+            </a:outerShdw>
+          </a:effectLst>
+        </p:spPr>
+        <p:style>
+          <a:lnRef idx="2">
+            <a:schemeClr val="accent1">
+              <a:shade val="50000"/>
+            </a:schemeClr>
+          </a:lnRef>
+          <a:fillRef idx="1">
+            <a:schemeClr val="accent1"/>
+          </a:fillRef>
+          <a:effectRef idx="0">
+            <a:schemeClr val="accent1"/>
+          </a:effectRef>
+          <a:fontRef idx="minor">
+            <a:schemeClr val="lt1"/>
+          </a:fontRef>
+        </p:style>
+        <p:txBody>
+          <a:bodyPr rtlCol="0" anchor="ctr"/>
+          <a:lstStyle/>
+          <a:p>
+            <a:pPr algn="ctr"/>
+            <a:endParaRPr lang="en-US" dirty="0">
+              <a:solidFill>
+                <a:srgbClr val="C3002F"/>
+              </a:solidFill>
+            </a:endParaRPr>
+          </a:p>
+        </p:txBody>
+      </p:sp>
+      <p:pic>
+        <p:nvPicPr>
+          <p:cNvPr id="12" name="Kép 11">
+            <a:extLst>
+              <a:ext uri="{FF2B5EF4-FFF2-40B4-BE49-F238E27FC236}">
+                <a16:creationId xmlns:a16="http://schemas.microsoft.com/office/drawing/2014/main" id="{8C2C5E9A-7AB3-46B6-831E-FDA76E94DE35}"/>
+              </a:ext>
+            </a:extLst>
+          </p:cNvPr>
+          <p:cNvPicPr>
+            <a:picLocks noChangeAspect="1"/>
+          </p:cNvPicPr>
+          <p:nvPr/>
+        </p:nvPicPr>
+        <p:blipFill>
+          <a:blip r:embed="rId4" cstate="hqprint">
+            <a:extLst>
+              <a:ext uri="{28A0092B-C50C-407E-A947-70E740481C1C}">
+                <a14:useLocalDpi xmlns:a14="http://schemas.microsoft.com/office/drawing/2010/main" val="0"/>
+              </a:ext>
+            </a:extLst>
+          </a:blip>
+          <a:stretch>
+            <a:fillRect/>
+          </a:stretch>
+        </p:blipFill>
+        <p:spPr>
+          <a:xfrm>
+            <a:off x="1991219" y="1618952"/>
+            <a:ext cx="2284467" cy="2284467"/>
+          </a:xfrm>
+          <a:prstGeom prst="rect">
+            <a:avLst/>
+          </a:prstGeom>
+          <a:scene3d>
+            <a:camera prst="isometricOffAxis2Top"/>
+            <a:lightRig rig="threePt" dir="t"/>
+          </a:scene3d>
+        </p:spPr>
+      </p:pic>
+      <p:sp>
+        <p:nvSpPr>
+          <p:cNvPr id="20" name="Téglalap 19">
+            <a:extLst>
+              <a:ext uri="{FF2B5EF4-FFF2-40B4-BE49-F238E27FC236}">
+                <a16:creationId xmlns:a16="http://schemas.microsoft.com/office/drawing/2014/main" id="{0A2BE2E7-2C7E-4517-95D8-E8324F3CEB6A}"/>
               </a:ext>
             </a:extLst>
           </p:cNvPr>
@@ -4792,15 +5166,13 @@
           <a:lstStyle/>
           <a:p>
             <a:r>
-              <a:rPr lang="en-GB" dirty="0">
+              <a:rPr lang="en-GB" sz="5400" dirty="0">
                 <a:latin typeface="IM FELL English" pitchFamily="2" charset="0"/>
               </a:rPr>
               <a:t> </a:t>
             </a:r>
             <a:r>
-              <a:rPr lang="en-GB" b="1" dirty="0">
-                <a:latin typeface="IM FELL English" pitchFamily="2" charset="0"/>
-              </a:rPr>
+              <a:rPr lang="en-GB" sz="5400" b="1" dirty="0"/>
               <a:t>Backend</a:t>
             </a:r>
           </a:p>
@@ -4818,8 +5190,8 @@
         </p:nvSpPr>
         <p:spPr>
           <a:xfrm>
-            <a:off x="1507620" y="1869835"/>
-            <a:ext cx="3080759" cy="4351338"/>
+            <a:off x="1219201" y="1869835"/>
+            <a:ext cx="3654930" cy="4351338"/>
           </a:xfrm>
         </p:spPr>
         <p:txBody>
@@ -4827,8 +5199,8 @@
           <a:lstStyle/>
           <a:p>
             <a:r>
-              <a:rPr lang="en-US" sz="3200" dirty="0">
-                <a:latin typeface="IM FELL English" pitchFamily="2" charset="0"/>
+              <a:rPr lang="en-US" sz="3600" b="1" dirty="0">
+                <a:latin typeface="+mj-lt"/>
               </a:rPr>
               <a:t>NodeJS</a:t>
             </a:r>
@@ -4836,8 +5208,8 @@
           <a:p>
             <a:pPr lvl="1"/>
             <a:r>
-              <a:rPr lang="en-US" sz="2600" dirty="0">
-                <a:latin typeface="IM FELL English" pitchFamily="2" charset="0"/>
+              <a:rPr lang="en-US" sz="2800" b="1" dirty="0">
+                <a:latin typeface="+mj-lt"/>
               </a:rPr>
               <a:t>Express</a:t>
             </a:r>
@@ -4845,39 +5217,45 @@
           <a:p>
             <a:pPr lvl="1"/>
             <a:r>
-              <a:rPr lang="en-US" sz="2600" dirty="0" err="1">
-                <a:latin typeface="IM FELL English" pitchFamily="2" charset="0"/>
+              <a:rPr lang="en-US" sz="2800" dirty="0" err="1">
+                <a:latin typeface="+mj-lt"/>
               </a:rPr>
               <a:t>Multer</a:t>
             </a:r>
-            <a:endParaRPr lang="en-US" sz="2600" dirty="0">
-              <a:latin typeface="IM FELL English" pitchFamily="2" charset="0"/>
+            <a:endParaRPr lang="en-US" sz="2800" dirty="0">
+              <a:latin typeface="+mj-lt"/>
             </a:endParaRPr>
           </a:p>
           <a:p>
             <a:pPr lvl="1"/>
             <a:r>
-              <a:rPr lang="en-US" sz="2600" dirty="0" err="1">
-                <a:latin typeface="IM FELL English" pitchFamily="2" charset="0"/>
+              <a:rPr lang="en-US" sz="2800" dirty="0" err="1">
+                <a:latin typeface="+mj-lt"/>
               </a:rPr>
               <a:t>Mysql</a:t>
             </a:r>
-            <a:endParaRPr lang="en-US" sz="2600" dirty="0">
-              <a:latin typeface="IM FELL English" pitchFamily="2" charset="0"/>
+            <a:endParaRPr lang="en-US" sz="2800" dirty="0">
+              <a:latin typeface="+mj-lt"/>
             </a:endParaRPr>
           </a:p>
           <a:p>
             <a:r>
-              <a:rPr lang="en-US" sz="3200" dirty="0">
-                <a:latin typeface="IM FELL English" pitchFamily="2" charset="0"/>
+              <a:rPr lang="en-US" sz="3600" b="1" dirty="0">
+                <a:latin typeface="+mj-lt"/>
               </a:rPr>
-              <a:t>API (JSON) </a:t>
-            </a:r>
-          </a:p>
-          <a:p>
-            <a:r>
-              <a:rPr lang="en-US" sz="3200" dirty="0">
-                <a:latin typeface="IM FELL English" pitchFamily="2" charset="0"/>
+              <a:t>API</a:t>
+            </a:r>
+            <a:r>
+              <a:rPr lang="en-US" sz="3600" dirty="0">
+                <a:latin typeface="+mj-lt"/>
+              </a:rPr>
+              <a:t> (JSON) </a:t>
+            </a:r>
+          </a:p>
+          <a:p>
+            <a:r>
+              <a:rPr lang="en-US" sz="3600" b="1" dirty="0">
+                <a:latin typeface="+mj-lt"/>
               </a:rPr>
               <a:t>Authentication</a:t>
             </a:r>
@@ -4885,8 +5263,8 @@
           <a:p>
             <a:pPr lvl="1"/>
             <a:r>
-              <a:rPr lang="en-US" sz="2600" dirty="0">
-                <a:latin typeface="IM FELL English" pitchFamily="2" charset="0"/>
+              <a:rPr lang="en-US" sz="2800" dirty="0">
+                <a:latin typeface="+mj-lt"/>
               </a:rPr>
               <a:t>JWT</a:t>
             </a:r>
@@ -4894,69 +5272,11 @@
           <a:p>
             <a:pPr lvl="1"/>
             <a:endParaRPr lang="hu-HU" dirty="0">
-              <a:latin typeface="IM FELL English" pitchFamily="2" charset="0"/>
+              <a:latin typeface="+mj-lt"/>
             </a:endParaRPr>
           </a:p>
         </p:txBody>
       </p:sp>
-      <p:pic>
-        <p:nvPicPr>
-          <p:cNvPr id="5" name="Tartalom helye 4" descr="nodejs.png">
-            <a:extLst>
-              <a:ext uri="{FF2B5EF4-FFF2-40B4-BE49-F238E27FC236}">
-                <a16:creationId xmlns:a16="http://schemas.microsoft.com/office/drawing/2014/main" id="{1A1722D2-6692-4569-BF6F-67E14E3921E8}"/>
-              </a:ext>
-            </a:extLst>
-          </p:cNvPr>
-          <p:cNvPicPr>
-            <a:picLocks noGrp="1" noChangeAspect="1"/>
-          </p:cNvPicPr>
-          <p:nvPr>
-            <p:ph sz="half" idx="2"/>
-          </p:nvPr>
-        </p:nvPicPr>
-        <p:blipFill>
-          <a:blip r:embed="rId2"/>
-          <a:stretch>
-            <a:fillRect/>
-          </a:stretch>
-        </p:blipFill>
-        <p:spPr>
-          <a:xfrm>
-            <a:off x="8740029" y="296382"/>
-            <a:ext cx="2952612" cy="4572449"/>
-          </a:xfrm>
-        </p:spPr>
-      </p:pic>
-      <p:pic>
-        <p:nvPicPr>
-          <p:cNvPr id="8" name="Kép 7">
-            <a:extLst>
-              <a:ext uri="{FF2B5EF4-FFF2-40B4-BE49-F238E27FC236}">
-                <a16:creationId xmlns:a16="http://schemas.microsoft.com/office/drawing/2014/main" id="{AE931E98-A415-44F2-81CB-C466A537238D}"/>
-              </a:ext>
-            </a:extLst>
-          </p:cNvPr>
-          <p:cNvPicPr>
-            <a:picLocks noChangeAspect="1"/>
-          </p:cNvPicPr>
-          <p:nvPr/>
-        </p:nvPicPr>
-        <p:blipFill rotWithShape="1">
-          <a:blip r:embed="rId3"/>
-          <a:srcRect l="19439" t="28471" r="46480" b="39728"/>
-          <a:stretch/>
-        </p:blipFill>
-        <p:spPr>
-          <a:xfrm>
-            <a:off x="6523170" y="4269800"/>
-            <a:ext cx="4449629" cy="2335361"/>
-          </a:xfrm>
-          <a:prstGeom prst="rect">
-            <a:avLst/>
-          </a:prstGeom>
-        </p:spPr>
-      </p:pic>
       <p:pic>
         <p:nvPicPr>
           <p:cNvPr id="4" name="Kép 3"/>
@@ -4966,7 +5286,7 @@
           <p:nvPr/>
         </p:nvPicPr>
         <p:blipFill>
-          <a:blip r:embed="rId4" cstate="hqprint">
+          <a:blip r:embed="rId2" cstate="hqprint">
             <a:extLst>
               <a:ext uri="{28A0092B-C50C-407E-A947-70E740481C1C}">
                 <a14:useLocalDpi xmlns:a14="http://schemas.microsoft.com/office/drawing/2010/main" val="0"/>
@@ -4979,8 +5299,66 @@
         </p:blipFill>
         <p:spPr>
           <a:xfrm>
-            <a:off x="6501195" y="1756621"/>
+            <a:off x="6457602" y="1690688"/>
             <a:ext cx="1991938" cy="1218402"/>
+          </a:xfrm>
+          <a:prstGeom prst="rect">
+            <a:avLst/>
+          </a:prstGeom>
+        </p:spPr>
+      </p:pic>
+      <p:pic>
+        <p:nvPicPr>
+          <p:cNvPr id="9" name="Kép 8">
+            <a:extLst>
+              <a:ext uri="{FF2B5EF4-FFF2-40B4-BE49-F238E27FC236}">
+                <a16:creationId xmlns:a16="http://schemas.microsoft.com/office/drawing/2014/main" id="{F12AE494-7054-4532-B30D-6F53D70077EF}"/>
+              </a:ext>
+            </a:extLst>
+          </p:cNvPr>
+          <p:cNvPicPr>
+            <a:picLocks noChangeAspect="1"/>
+          </p:cNvPicPr>
+          <p:nvPr/>
+        </p:nvPicPr>
+        <p:blipFill rotWithShape="1">
+          <a:blip r:embed="rId3"/>
+          <a:srcRect l="2500" t="41389" r="83672" b="21666"/>
+          <a:stretch/>
+        </p:blipFill>
+        <p:spPr>
+          <a:xfrm>
+            <a:off x="8811141" y="132963"/>
+            <a:ext cx="3056733" cy="4593734"/>
+          </a:xfrm>
+          <a:prstGeom prst="rect">
+            <a:avLst/>
+          </a:prstGeom>
+        </p:spPr>
+      </p:pic>
+      <p:pic>
+        <p:nvPicPr>
+          <p:cNvPr id="11" name="Kép 10">
+            <a:extLst>
+              <a:ext uri="{FF2B5EF4-FFF2-40B4-BE49-F238E27FC236}">
+                <a16:creationId xmlns:a16="http://schemas.microsoft.com/office/drawing/2014/main" id="{75A173F3-A291-4D49-8445-2094B2560E89}"/>
+              </a:ext>
+            </a:extLst>
+          </p:cNvPr>
+          <p:cNvPicPr>
+            <a:picLocks noChangeAspect="1"/>
+          </p:cNvPicPr>
+          <p:nvPr/>
+        </p:nvPicPr>
+        <p:blipFill rotWithShape="1">
+          <a:blip r:embed="rId4"/>
+          <a:srcRect l="18985" t="23889" r="46449" b="44444"/>
+          <a:stretch/>
+        </p:blipFill>
+        <p:spPr>
+          <a:xfrm>
+            <a:off x="6499156" y="4188019"/>
+            <a:ext cx="4957156" cy="2554429"/>
           </a:xfrm>
           <a:prstGeom prst="rect">
             <a:avLst/>
@@ -5038,7 +5416,7 @@
         <p:spPr>
           <a:xfrm>
             <a:off x="1" y="1"/>
-            <a:ext cx="6095999" cy="6857999"/>
+            <a:ext cx="5962322" cy="6857999"/>
           </a:xfrm>
           <a:prstGeom prst="rect">
             <a:avLst/>
@@ -5105,46 +5483,51 @@
           <a:lstStyle/>
           <a:p>
             <a:r>
-              <a:rPr lang="hu-HU" b="1" dirty="0">
-                <a:latin typeface="IM FELL English" pitchFamily="2" charset="0"/>
+              <a:rPr lang="hu-HU" sz="5400" b="1" dirty="0"/>
+              <a:t>Frontend</a:t>
+            </a:r>
+          </a:p>
+        </p:txBody>
+      </p:sp>
+      <p:sp>
+        <p:nvSpPr>
+          <p:cNvPr id="3" name="Tartalom helye 2"/>
+          <p:cNvSpPr>
+            <a:spLocks noGrp="1"/>
+          </p:cNvSpPr>
+          <p:nvPr>
+            <p:ph sz="half" idx="1"/>
+          </p:nvPr>
+        </p:nvSpPr>
+        <p:spPr>
+          <a:xfrm>
+            <a:off x="6742498" y="1590486"/>
+            <a:ext cx="4803004" cy="4837075"/>
+          </a:xfrm>
+        </p:spPr>
+        <p:txBody>
+          <a:bodyPr>
+            <a:normAutofit/>
+          </a:bodyPr>
+          <a:lstStyle/>
+          <a:p>
+            <a:r>
+              <a:rPr lang="en-GB" sz="3600" b="1" dirty="0">
+                <a:latin typeface="+mj-lt"/>
               </a:rPr>
-              <a:t>Frontend</a:t>
-            </a:r>
-            <a:endParaRPr lang="hu-HU" b="1" dirty="0"/>
-          </a:p>
-        </p:txBody>
-      </p:sp>
-      <p:sp>
-        <p:nvSpPr>
-          <p:cNvPr id="3" name="Tartalom helye 2"/>
-          <p:cNvSpPr>
-            <a:spLocks noGrp="1"/>
-          </p:cNvSpPr>
-          <p:nvPr>
-            <p:ph sz="half" idx="1"/>
-          </p:nvPr>
-        </p:nvSpPr>
-        <p:spPr>
-          <a:xfrm>
-            <a:off x="6996479" y="1849476"/>
-            <a:ext cx="4218842" cy="4351338"/>
-          </a:xfrm>
-        </p:spPr>
-        <p:txBody>
-          <a:bodyPr/>
-          <a:lstStyle/>
-          <a:p>
-            <a:r>
-              <a:rPr lang="en-GB" dirty="0">
-                <a:latin typeface="IM FELL English" pitchFamily="2" charset="0"/>
+              <a:t>Angular</a:t>
+            </a:r>
+            <a:r>
+              <a:rPr lang="en-GB" sz="3600" dirty="0">
+                <a:latin typeface="+mj-lt"/>
               </a:rPr>
-              <a:t>Angular, TypeScript</a:t>
-            </a:r>
-          </a:p>
-          <a:p>
-            <a:r>
-              <a:rPr lang="hu-HU" dirty="0">
-                <a:latin typeface="IM FELL English" pitchFamily="2" charset="0"/>
+              <a:t>, TypeScript</a:t>
+            </a:r>
+          </a:p>
+          <a:p>
+            <a:r>
+              <a:rPr lang="hu-HU" sz="3600" b="1" dirty="0">
+                <a:latin typeface="+mj-lt"/>
               </a:rPr>
               <a:t>Design</a:t>
             </a:r>
@@ -5152,8 +5535,8 @@
           <a:p>
             <a:pPr lvl="1"/>
             <a:r>
-              <a:rPr lang="en-US" dirty="0">
-                <a:latin typeface="IM FELL English" pitchFamily="2" charset="0"/>
+              <a:rPr lang="en-US" sz="2800" dirty="0">
+                <a:latin typeface="+mj-lt"/>
               </a:rPr>
               <a:t>Responsive</a:t>
             </a:r>
@@ -5161,55 +5544,55 @@
           <a:p>
             <a:pPr lvl="1"/>
             <a:r>
-              <a:rPr lang="en-GB" dirty="0">
-                <a:latin typeface="IM FELL English" pitchFamily="2" charset="0"/>
+              <a:rPr lang="en-GB" sz="2800" dirty="0">
+                <a:latin typeface="+mj-lt"/>
               </a:rPr>
               <a:t>Bootstrap SCSS directory</a:t>
             </a:r>
-            <a:endParaRPr lang="hu-HU" dirty="0">
-              <a:latin typeface="IM FELL English" pitchFamily="2" charset="0"/>
+            <a:endParaRPr lang="hu-HU" sz="2800" dirty="0">
+              <a:latin typeface="+mj-lt"/>
             </a:endParaRPr>
           </a:p>
           <a:p>
             <a:pPr lvl="1"/>
             <a:r>
-              <a:rPr lang="en-US" dirty="0">
-                <a:latin typeface="IM FELL English" pitchFamily="2" charset="0"/>
+              <a:rPr lang="en-US" sz="2800" dirty="0">
+                <a:latin typeface="+mj-lt"/>
               </a:rPr>
               <a:t>Font Awesome</a:t>
             </a:r>
           </a:p>
           <a:p>
             <a:r>
-              <a:rPr lang="en-GB" dirty="0">
-                <a:latin typeface="IM FELL English" pitchFamily="2" charset="0"/>
+              <a:rPr lang="en-GB" sz="3600" dirty="0">
+                <a:latin typeface="+mj-lt"/>
               </a:rPr>
               <a:t>Components</a:t>
             </a:r>
           </a:p>
           <a:p>
             <a:r>
-              <a:rPr lang="en-GB" dirty="0" err="1">
-                <a:latin typeface="IM FELL English" pitchFamily="2" charset="0"/>
+              <a:rPr lang="en-GB" sz="3600" dirty="0" err="1">
+                <a:latin typeface="+mj-lt"/>
               </a:rPr>
               <a:t>HttpClient</a:t>
             </a:r>
             <a:r>
-              <a:rPr lang="en-GB" dirty="0">
-                <a:latin typeface="IM FELL English" pitchFamily="2" charset="0"/>
+              <a:rPr lang="en-GB" sz="3600" dirty="0">
+                <a:latin typeface="+mj-lt"/>
               </a:rPr>
               <a:t> service</a:t>
             </a:r>
           </a:p>
           <a:p>
             <a:r>
-              <a:rPr lang="hu-HU" dirty="0" err="1">
-                <a:latin typeface="IM FELL English" pitchFamily="2" charset="0"/>
+              <a:rPr lang="hu-HU" sz="3600" dirty="0" err="1">
+                <a:latin typeface="+mj-lt"/>
               </a:rPr>
               <a:t>Forms</a:t>
             </a:r>
-            <a:endParaRPr lang="en-GB" dirty="0">
-              <a:latin typeface="IM FELL English" pitchFamily="2" charset="0"/>
+            <a:endParaRPr lang="en-GB" sz="3600" dirty="0">
+              <a:latin typeface="+mj-lt"/>
             </a:endParaRPr>
           </a:p>
         </p:txBody>
@@ -5235,35 +5618,12 @@
         </p:blipFill>
         <p:spPr>
           <a:xfrm>
-            <a:off x="417653" y="281150"/>
+            <a:off x="703384" y="305813"/>
             <a:ext cx="2435290" cy="5299788"/>
           </a:xfrm>
           <a:prstGeom prst="rect">
             <a:avLst/>
           </a:prstGeom>
-        </p:spPr>
-      </p:pic>
-      <p:pic>
-        <p:nvPicPr>
-          <p:cNvPr id="7" name="Tartalom helye 6" descr="http get.png"/>
-          <p:cNvPicPr>
-            <a:picLocks noGrp="1" noChangeAspect="1"/>
-          </p:cNvPicPr>
-          <p:nvPr>
-            <p:ph sz="half" idx="2"/>
-          </p:nvPr>
-        </p:nvPicPr>
-        <p:blipFill>
-          <a:blip r:embed="rId3"/>
-          <a:stretch>
-            <a:fillRect/>
-          </a:stretch>
-        </p:blipFill>
-        <p:spPr>
-          <a:xfrm>
-            <a:off x="1302394" y="4212984"/>
-            <a:ext cx="4541057" cy="2214577"/>
-          </a:xfrm>
         </p:spPr>
       </p:pic>
       <p:pic>
@@ -5275,7 +5635,7 @@
           <p:nvPr/>
         </p:nvPicPr>
         <p:blipFill>
-          <a:blip r:embed="rId4" cstate="hqprint">
+          <a:blip r:embed="rId3" cstate="hqprint">
             <a:extLst>
               <a:ext uri="{28A0092B-C50C-407E-A947-70E740481C1C}">
                 <a14:useLocalDpi xmlns:a14="http://schemas.microsoft.com/office/drawing/2010/main" val="0"/>
@@ -5288,8 +5648,37 @@
         </p:blipFill>
         <p:spPr>
           <a:xfrm>
-            <a:off x="3481252" y="1171413"/>
-            <a:ext cx="1870159" cy="1870159"/>
+            <a:off x="3241625" y="1256026"/>
+            <a:ext cx="2614748" cy="2614748"/>
+          </a:xfrm>
+          <a:prstGeom prst="rect">
+            <a:avLst/>
+          </a:prstGeom>
+        </p:spPr>
+      </p:pic>
+      <p:pic>
+        <p:nvPicPr>
+          <p:cNvPr id="9" name="Kép 8">
+            <a:extLst>
+              <a:ext uri="{FF2B5EF4-FFF2-40B4-BE49-F238E27FC236}">
+                <a16:creationId xmlns:a16="http://schemas.microsoft.com/office/drawing/2014/main" id="{E4C7936A-FEAF-469E-806D-26C446D1E52A}"/>
+              </a:ext>
+            </a:extLst>
+          </p:cNvPr>
+          <p:cNvPicPr>
+            <a:picLocks noChangeAspect="1"/>
+          </p:cNvPicPr>
+          <p:nvPr/>
+        </p:nvPicPr>
+        <p:blipFill rotWithShape="1">
+          <a:blip r:embed="rId4"/>
+          <a:srcRect l="36375" t="27200" r="21025" b="50000"/>
+          <a:stretch/>
+        </p:blipFill>
+        <p:spPr>
+          <a:xfrm>
+            <a:off x="105950" y="4820986"/>
+            <a:ext cx="5750423" cy="1731201"/>
           </a:xfrm>
           <a:prstGeom prst="rect">
             <a:avLst/>
@@ -5414,18 +5803,13 @@
           <a:lstStyle/>
           <a:p>
             <a:r>
-              <a:rPr lang="en-GB" dirty="0">
-                <a:latin typeface="IM FELL English" pitchFamily="2" charset="0"/>
-              </a:rPr>
+              <a:rPr lang="en-GB" sz="5400" dirty="0"/>
               <a:t>D</a:t>
             </a:r>
             <a:r>
-              <a:rPr lang="en-GB" b="1" dirty="0">
-                <a:latin typeface="IM FELL English" pitchFamily="2" charset="0"/>
-              </a:rPr>
+              <a:rPr lang="en-GB" sz="5400" b="1" dirty="0"/>
               <a:t>atabase</a:t>
             </a:r>
-            <a:endParaRPr lang="en-GB" b="1" dirty="0"/>
           </a:p>
         </p:txBody>
       </p:sp>
@@ -5441,7 +5825,7 @@
         </p:nvSpPr>
         <p:spPr>
           <a:xfrm>
-            <a:off x="845083" y="2766217"/>
+            <a:off x="845083" y="2766219"/>
             <a:ext cx="4405834" cy="1325563"/>
           </a:xfrm>
         </p:spPr>
@@ -5452,16 +5836,22 @@
           <a:lstStyle/>
           <a:p>
             <a:r>
+              <a:rPr lang="en-GB" sz="3600" b="1" dirty="0">
+                <a:latin typeface="+mj-lt"/>
+              </a:rPr>
+              <a:t>MySQL</a:t>
+            </a:r>
+            <a:r>
               <a:rPr lang="en-GB" sz="3600" dirty="0">
-                <a:latin typeface="IM FELL English" pitchFamily="2" charset="0"/>
+                <a:latin typeface="+mj-lt"/>
               </a:rPr>
-              <a:t>MySQL (MariaDB)</a:t>
-            </a:r>
-          </a:p>
-          <a:p>
-            <a:r>
-              <a:rPr lang="en-GB" sz="3600" dirty="0">
-                <a:latin typeface="IM FELL English" pitchFamily="2" charset="0"/>
+              <a:t> (MariaDB)</a:t>
+            </a:r>
+          </a:p>
+          <a:p>
+            <a:r>
+              <a:rPr lang="en-GB" sz="3600" b="1" dirty="0">
+                <a:latin typeface="+mj-lt"/>
               </a:rPr>
               <a:t>Stored procedures</a:t>
             </a:r>
@@ -5486,8 +5876,8 @@
         </p:blipFill>
         <p:spPr>
           <a:xfrm>
-            <a:off x="7410994" y="3335520"/>
-            <a:ext cx="4370999" cy="3053338"/>
+            <a:off x="6572249" y="2766219"/>
+            <a:ext cx="5143500" cy="3592964"/>
           </a:xfrm>
         </p:spPr>
       </p:pic>
@@ -5513,7 +5903,7 @@
         </p:blipFill>
         <p:spPr>
           <a:xfrm>
-            <a:off x="6096000" y="-23812"/>
+            <a:off x="6572249" y="-276563"/>
             <a:ext cx="5143500" cy="3429000"/>
           </a:xfrm>
           <a:prstGeom prst="rect">
@@ -5642,9 +6032,7 @@
           <a:lstStyle/>
           <a:p>
             <a:r>
-              <a:rPr lang="en-US" b="1" dirty="0">
-                <a:latin typeface="IM FELL English" pitchFamily="2" charset="0"/>
-              </a:rPr>
+              <a:rPr lang="en-US" b="1" dirty="0"/>
               <a:t>Teamwork</a:t>
             </a:r>
           </a:p>
@@ -5662,8 +6050,8 @@
         </p:nvSpPr>
         <p:spPr>
           <a:xfrm>
-            <a:off x="2921466" y="1600201"/>
-            <a:ext cx="6349069" cy="4892674"/>
+            <a:off x="3935243" y="1690688"/>
+            <a:ext cx="4321515" cy="4762499"/>
           </a:xfrm>
         </p:spPr>
         <p:txBody>
@@ -5673,14 +6061,14 @@
           <a:lstStyle/>
           <a:p>
             <a:r>
-              <a:rPr lang="en-US" dirty="0">
-                <a:latin typeface="IM FELL English" pitchFamily="2" charset="0"/>
+              <a:rPr lang="en-US" sz="3600" b="1" dirty="0">
+                <a:latin typeface="+mj-lt"/>
               </a:rPr>
               <a:t>GitHub</a:t>
             </a:r>
             <a:r>
-              <a:rPr lang="hu-HU" dirty="0">
-                <a:latin typeface="IM FELL English" pitchFamily="2" charset="0"/>
+              <a:rPr lang="hu-HU" sz="3600" dirty="0">
+                <a:latin typeface="+mj-lt"/>
               </a:rPr>
               <a:t> </a:t>
             </a:r>
@@ -5688,8 +6076,8 @@
           <a:p>
             <a:pPr lvl="1"/>
             <a:r>
-              <a:rPr lang="en-US" dirty="0">
-                <a:latin typeface="IM FELL English" pitchFamily="2" charset="0"/>
+              <a:rPr lang="en-US" sz="2800" dirty="0">
+                <a:latin typeface="+mj-lt"/>
               </a:rPr>
               <a:t>Issues</a:t>
             </a:r>
@@ -5697,24 +6085,24 @@
           <a:p>
             <a:pPr lvl="1"/>
             <a:r>
-              <a:rPr lang="en-US" dirty="0">
-                <a:latin typeface="IM FELL English" pitchFamily="2" charset="0"/>
+              <a:rPr lang="en-US" sz="2800" dirty="0">
+                <a:latin typeface="+mj-lt"/>
               </a:rPr>
               <a:t>Progress-tracking</a:t>
             </a:r>
           </a:p>
           <a:p>
             <a:r>
-              <a:rPr lang="en-US" dirty="0">
-                <a:latin typeface="IM FELL English" pitchFamily="2" charset="0"/>
+              <a:rPr lang="en-US" sz="3600" b="1" dirty="0">
+                <a:latin typeface="+mj-lt"/>
               </a:rPr>
               <a:t>Clean code</a:t>
             </a:r>
           </a:p>
           <a:p>
             <a:r>
-              <a:rPr lang="en-US" dirty="0">
-                <a:latin typeface="IM FELL English" pitchFamily="2" charset="0"/>
+              <a:rPr lang="en-US" sz="3600" b="1" dirty="0">
+                <a:latin typeface="+mj-lt"/>
               </a:rPr>
               <a:t>Workload sharing</a:t>
             </a:r>
@@ -5722,31 +6110,221 @@
           <a:p>
             <a:pPr lvl="1"/>
             <a:r>
-              <a:rPr lang="en-US" dirty="0">
-                <a:latin typeface="IM FELL English" pitchFamily="2" charset="0"/>
+              <a:rPr lang="en-US" sz="2800" dirty="0">
+                <a:latin typeface="+mj-lt"/>
               </a:rPr>
               <a:t>Feature based</a:t>
             </a:r>
+            <a:endParaRPr lang="hu-HU" sz="2800" dirty="0">
+              <a:latin typeface="+mj-lt"/>
+            </a:endParaRPr>
+          </a:p>
+          <a:p>
+            <a:pPr lvl="1"/>
+            <a:r>
+              <a:rPr lang="en-US" sz="2800" dirty="0">
+                <a:latin typeface="+mj-lt"/>
+              </a:rPr>
+              <a:t>Not divided by backend/frontend</a:t>
+            </a:r>
+          </a:p>
+          <a:p>
             <a:endParaRPr lang="hu-HU" dirty="0">
               <a:latin typeface="IM FELL English" pitchFamily="2" charset="0"/>
             </a:endParaRPr>
           </a:p>
-          <a:p>
-            <a:pPr lvl="1"/>
-            <a:r>
-              <a:rPr lang="en-US" dirty="0">
-                <a:latin typeface="IM FELL English" pitchFamily="2" charset="0"/>
-              </a:rPr>
-              <a:t>Not divided by backend/frontend</a:t>
-            </a:r>
-          </a:p>
-          <a:p>
-            <a:endParaRPr lang="hu-HU" dirty="0">
-              <a:latin typeface="IM FELL English" pitchFamily="2" charset="0"/>
-            </a:endParaRPr>
-          </a:p>
-        </p:txBody>
-      </p:sp>
+        </p:txBody>
+      </p:sp>
+      <p:sp>
+        <p:nvSpPr>
+          <p:cNvPr id="4" name="Téglalap 3">
+            <a:extLst>
+              <a:ext uri="{FF2B5EF4-FFF2-40B4-BE49-F238E27FC236}">
+                <a16:creationId xmlns:a16="http://schemas.microsoft.com/office/drawing/2014/main" id="{D26F8A6F-AA25-4C02-8C66-504053F241DE}"/>
+              </a:ext>
+            </a:extLst>
+          </p:cNvPr>
+          <p:cNvSpPr/>
+          <p:nvPr/>
+        </p:nvSpPr>
+        <p:spPr>
+          <a:xfrm>
+            <a:off x="0" y="1"/>
+            <a:ext cx="3218569" cy="6857999"/>
+          </a:xfrm>
+          <a:prstGeom prst="rect">
+            <a:avLst/>
+          </a:prstGeom>
+          <a:solidFill>
+            <a:srgbClr val="859C62"/>
+          </a:solidFill>
+          <a:ln>
+            <a:noFill/>
+          </a:ln>
+          <a:effectLst>
+            <a:outerShdw blurRad="50800" dist="38100" algn="l" rotWithShape="0">
+              <a:prstClr val="black">
+                <a:alpha val="40000"/>
+              </a:prstClr>
+            </a:outerShdw>
+          </a:effectLst>
+        </p:spPr>
+        <p:style>
+          <a:lnRef idx="2">
+            <a:schemeClr val="accent1">
+              <a:shade val="50000"/>
+            </a:schemeClr>
+          </a:lnRef>
+          <a:fillRef idx="1">
+            <a:schemeClr val="accent1"/>
+          </a:fillRef>
+          <a:effectRef idx="0">
+            <a:schemeClr val="accent1"/>
+          </a:effectRef>
+          <a:fontRef idx="minor">
+            <a:schemeClr val="lt1"/>
+          </a:fontRef>
+        </p:style>
+        <p:txBody>
+          <a:bodyPr rtlCol="0" anchor="ctr"/>
+          <a:lstStyle/>
+          <a:p>
+            <a:pPr algn="ctr"/>
+            <a:endParaRPr lang="en-US"/>
+          </a:p>
+        </p:txBody>
+      </p:sp>
+      <p:sp>
+        <p:nvSpPr>
+          <p:cNvPr id="5" name="Téglalap 4">
+            <a:extLst>
+              <a:ext uri="{FF2B5EF4-FFF2-40B4-BE49-F238E27FC236}">
+                <a16:creationId xmlns:a16="http://schemas.microsoft.com/office/drawing/2014/main" id="{4B99CA4B-CB9A-4E4F-B215-74615E93F95D}"/>
+              </a:ext>
+            </a:extLst>
+          </p:cNvPr>
+          <p:cNvSpPr/>
+          <p:nvPr/>
+        </p:nvSpPr>
+        <p:spPr>
+          <a:xfrm>
+            <a:off x="8970643" y="0"/>
+            <a:ext cx="3221358" cy="6857999"/>
+          </a:xfrm>
+          <a:prstGeom prst="rect">
+            <a:avLst/>
+          </a:prstGeom>
+          <a:solidFill>
+            <a:srgbClr val="859C62"/>
+          </a:solidFill>
+          <a:ln>
+            <a:noFill/>
+          </a:ln>
+          <a:effectLst>
+            <a:outerShdw blurRad="50800" dist="38100" dir="10800000" algn="r" rotWithShape="0">
+              <a:prstClr val="black">
+                <a:alpha val="40000"/>
+              </a:prstClr>
+            </a:outerShdw>
+          </a:effectLst>
+        </p:spPr>
+        <p:style>
+          <a:lnRef idx="2">
+            <a:schemeClr val="accent1">
+              <a:shade val="50000"/>
+            </a:schemeClr>
+          </a:lnRef>
+          <a:fillRef idx="1">
+            <a:schemeClr val="accent1"/>
+          </a:fillRef>
+          <a:effectRef idx="0">
+            <a:schemeClr val="accent1"/>
+          </a:effectRef>
+          <a:fontRef idx="minor">
+            <a:schemeClr val="lt1"/>
+          </a:fontRef>
+        </p:style>
+        <p:txBody>
+          <a:bodyPr rtlCol="0" anchor="ctr"/>
+          <a:lstStyle/>
+          <a:p>
+            <a:pPr algn="ctr"/>
+            <a:endParaRPr lang="en-US"/>
+          </a:p>
+        </p:txBody>
+      </p:sp>
+      <p:pic>
+        <p:nvPicPr>
+          <p:cNvPr id="9" name="Kép 8">
+            <a:extLst>
+              <a:ext uri="{FF2B5EF4-FFF2-40B4-BE49-F238E27FC236}">
+                <a16:creationId xmlns:a16="http://schemas.microsoft.com/office/drawing/2014/main" id="{1FFC4681-5362-4378-821C-5413173EA404}"/>
+              </a:ext>
+            </a:extLst>
+          </p:cNvPr>
+          <p:cNvPicPr>
+            <a:picLocks noChangeAspect="1"/>
+          </p:cNvPicPr>
+          <p:nvPr/>
+        </p:nvPicPr>
+        <p:blipFill>
+          <a:blip r:embed="rId2">
+            <a:extLst>
+              <a:ext uri="{28A0092B-C50C-407E-A947-70E740481C1C}">
+                <a14:useLocalDpi xmlns:a14="http://schemas.microsoft.com/office/drawing/2010/main" val="0"/>
+              </a:ext>
+            </a:extLst>
+          </a:blip>
+          <a:stretch>
+            <a:fillRect/>
+          </a:stretch>
+        </p:blipFill>
+        <p:spPr>
+          <a:xfrm>
+            <a:off x="9830311" y="2480685"/>
+            <a:ext cx="1896628" cy="1896628"/>
+          </a:xfrm>
+          <a:prstGeom prst="rect">
+            <a:avLst/>
+          </a:prstGeom>
+        </p:spPr>
+      </p:pic>
+      <p:pic>
+        <p:nvPicPr>
+          <p:cNvPr id="7" name="Kép 6">
+            <a:extLst>
+              <a:ext uri="{FF2B5EF4-FFF2-40B4-BE49-F238E27FC236}">
+                <a16:creationId xmlns:a16="http://schemas.microsoft.com/office/drawing/2014/main" id="{5FFD9DF9-6350-4AB1-9144-5FEE81574B8D}"/>
+              </a:ext>
+            </a:extLst>
+          </p:cNvPr>
+          <p:cNvPicPr>
+            <a:picLocks noChangeAspect="1"/>
+          </p:cNvPicPr>
+          <p:nvPr/>
+        </p:nvPicPr>
+        <p:blipFill>
+          <a:blip r:embed="rId3">
+            <a:extLst>
+              <a:ext uri="{28A0092B-C50C-407E-A947-70E740481C1C}">
+                <a14:useLocalDpi xmlns:a14="http://schemas.microsoft.com/office/drawing/2010/main" val="0"/>
+              </a:ext>
+            </a:extLst>
+          </a:blip>
+          <a:stretch>
+            <a:fillRect/>
+          </a:stretch>
+        </p:blipFill>
+        <p:spPr>
+          <a:xfrm>
+            <a:off x="-203260" y="2235231"/>
+            <a:ext cx="3625088" cy="2039112"/>
+          </a:xfrm>
+          <a:prstGeom prst="rect">
+            <a:avLst/>
+          </a:prstGeom>
+        </p:spPr>
+      </p:pic>
     </p:spTree>
   </p:cSld>
   <p:clrMapOvr>

</xml_diff>